<commit_message>
Szakdolgozat rewrote to LaTeX
</commit_message>
<xml_diff>
--- a/Szakdolgozat_mérések_grafikonok.pptx
+++ b/Szakdolgozat_mérések_grafikonok.pptx
@@ -4320,6 +4320,166 @@
               <a:rPr lang="hu-HU" dirty="0"/>
               <a:t>Mozgás jobbra</a:t>
             </a:r>
+          </a:p>
+        </p:txBody>
+      </p:sp>
+      <p:sp>
+        <p:nvSpPr>
+          <p:cNvPr id="10" name="Téglalap 9">
+            <a:extLst>
+              <a:ext uri="{FF2B5EF4-FFF2-40B4-BE49-F238E27FC236}">
+                <a16:creationId xmlns:a16="http://schemas.microsoft.com/office/drawing/2014/main" id="{BABFAB7C-DC39-A5A9-2DB0-7E03EB96DCBE}"/>
+              </a:ext>
+            </a:extLst>
+          </p:cNvPr>
+          <p:cNvSpPr/>
+          <p:nvPr/>
+        </p:nvSpPr>
+        <p:spPr>
+          <a:xfrm>
+            <a:off x="2751973" y="5770309"/>
+            <a:ext cx="2256252" cy="551753"/>
+          </a:xfrm>
+          <a:prstGeom prst="rect">
+            <a:avLst/>
+          </a:prstGeom>
+          <a:ln>
+            <a:noFill/>
+          </a:ln>
+          <a:scene3d>
+            <a:camera prst="orthographicFront"/>
+            <a:lightRig rig="threePt" dir="t"/>
+          </a:scene3d>
+          <a:sp3d>
+            <a:bevelT/>
+          </a:sp3d>
+        </p:spPr>
+        <p:style>
+          <a:lnRef idx="2">
+            <a:schemeClr val="accent2">
+              <a:shade val="15000"/>
+            </a:schemeClr>
+          </a:lnRef>
+          <a:fillRef idx="1">
+            <a:schemeClr val="accent2"/>
+          </a:fillRef>
+          <a:effectRef idx="0">
+            <a:schemeClr val="accent2"/>
+          </a:effectRef>
+          <a:fontRef idx="minor">
+            <a:schemeClr val="lt1"/>
+          </a:fontRef>
+        </p:style>
+        <p:txBody>
+          <a:bodyPr rtlCol="0" anchor="ctr"/>
+          <a:lstStyle/>
+          <a:p>
+            <a:pPr algn="ctr"/>
+            <a:r>
+              <a:rPr lang="hu-HU" sz="4000" dirty="0"/>
+              <a:t>T</a:t>
+            </a:r>
+          </a:p>
+        </p:txBody>
+      </p:sp>
+      <p:sp>
+        <p:nvSpPr>
+          <p:cNvPr id="16" name="Szövegdoboz 15">
+            <a:extLst>
+              <a:ext uri="{FF2B5EF4-FFF2-40B4-BE49-F238E27FC236}">
+                <a16:creationId xmlns:a16="http://schemas.microsoft.com/office/drawing/2014/main" id="{2E6437E4-7810-7E95-D308-03F476A2D9DE}"/>
+              </a:ext>
+            </a:extLst>
+          </p:cNvPr>
+          <p:cNvSpPr txBox="1"/>
+          <p:nvPr/>
+        </p:nvSpPr>
+        <p:spPr>
+          <a:xfrm>
+            <a:off x="7227308" y="5861519"/>
+            <a:ext cx="2256253" cy="369332"/>
+          </a:xfrm>
+          <a:prstGeom prst="rect">
+            <a:avLst/>
+          </a:prstGeom>
+          <a:noFill/>
+        </p:spPr>
+        <p:txBody>
+          <a:bodyPr wrap="square" rtlCol="0">
+            <a:spAutoFit/>
+          </a:bodyPr>
+          <a:lstStyle/>
+          <a:p>
+            <a:pPr algn="ctr"/>
+            <a:r>
+              <a:rPr lang="hu-HU" dirty="0" err="1"/>
+              <a:t>Grappling</a:t>
+            </a:r>
+            <a:r>
+              <a:rPr lang="hu-HU" dirty="0"/>
+              <a:t> </a:t>
+            </a:r>
+            <a:r>
+              <a:rPr lang="hu-HU" dirty="0" err="1"/>
+              <a:t>Hook</a:t>
+            </a:r>
+            <a:endParaRPr lang="hu-HU" dirty="0"/>
+          </a:p>
+        </p:txBody>
+      </p:sp>
+      <p:sp>
+        <p:nvSpPr>
+          <p:cNvPr id="22" name="Nyíl: jobbra mutató 21">
+            <a:extLst>
+              <a:ext uri="{FF2B5EF4-FFF2-40B4-BE49-F238E27FC236}">
+                <a16:creationId xmlns:a16="http://schemas.microsoft.com/office/drawing/2014/main" id="{D4410679-B05A-B71F-8A6C-8D7920C29A32}"/>
+              </a:ext>
+            </a:extLst>
+          </p:cNvPr>
+          <p:cNvSpPr/>
+          <p:nvPr/>
+        </p:nvSpPr>
+        <p:spPr>
+          <a:xfrm>
+            <a:off x="5746458" y="5907767"/>
+            <a:ext cx="1535186" cy="276836"/>
+          </a:xfrm>
+          <a:prstGeom prst="rightArrow">
+            <a:avLst/>
+          </a:prstGeom>
+          <a:ln>
+            <a:noFill/>
+          </a:ln>
+          <a:scene3d>
+            <a:camera prst="orthographicFront"/>
+            <a:lightRig rig="threePt" dir="t"/>
+          </a:scene3d>
+          <a:sp3d>
+            <a:bevelT/>
+          </a:sp3d>
+        </p:spPr>
+        <p:style>
+          <a:lnRef idx="2">
+            <a:schemeClr val="accent2">
+              <a:shade val="15000"/>
+            </a:schemeClr>
+          </a:lnRef>
+          <a:fillRef idx="1">
+            <a:schemeClr val="accent2"/>
+          </a:fillRef>
+          <a:effectRef idx="0">
+            <a:schemeClr val="accent2"/>
+          </a:effectRef>
+          <a:fontRef idx="minor">
+            <a:schemeClr val="lt1"/>
+          </a:fontRef>
+        </p:style>
+        <p:txBody>
+          <a:bodyPr rtlCol="0" anchor="ctr"/>
+          <a:lstStyle/>
+          <a:p>
+            <a:pPr algn="ctr"/>
+            <a:endParaRPr lang="hu-HU"/>
           </a:p>
         </p:txBody>
       </p:sp>

</xml_diff>